<commit_message>
ppt estructura y app backend
</commit_message>
<xml_diff>
--- a/Presentacion.pptx
+++ b/Presentacion.pptx
@@ -10653,7 +10653,6 @@
               <a:rPr lang="es-AR" dirty="0"/>
               <a:t>Tecnologías</a:t>
             </a:r>
-            <a:endParaRPr lang="es-AR" dirty="0"/>
           </a:p>
         </p:txBody>
       </p:sp>
@@ -12800,8 +12799,29 @@
             </a:r>
             <a:r>
               <a:rPr lang="es-AR" dirty="0"/>
-              <a:t> Framework Core 2</a:t>
-            </a:r>
+              <a:t> Framework Core </a:t>
+            </a:r>
+            <a:r>
+              <a:rPr lang="es-AR" dirty="0"/>
+              <a:t>2 </a:t>
+            </a:r>
+            <a:r>
+              <a:rPr lang="es-AR" dirty="0">
+                <a:hlinkClick r:id="rId2"/>
+              </a:rPr>
+              <a:t>https://</a:t>
+            </a:r>
+            <a:r>
+              <a:rPr lang="es-AR" dirty="0" smtClean="0">
+                <a:hlinkClick r:id="rId2"/>
+              </a:rPr>
+              <a:t>goo.gl/IWvH61</a:t>
+            </a:r>
+            <a:r>
+              <a:rPr lang="es-AR" dirty="0" smtClean="0"/>
+              <a:t> </a:t>
+            </a:r>
+            <a:endParaRPr lang="es-AR" dirty="0"/>
           </a:p>
           <a:p>
             <a:endParaRPr lang="es-AR" dirty="0"/>
@@ -12823,7 +12843,104 @@
           <a:bodyPr/>
           <a:lstStyle/>
           <a:p>
-            <a:endParaRPr lang="es-AR"/>
+            <a:r>
+              <a:rPr lang="es-AR" dirty="0"/>
+              <a:t>IOC DI </a:t>
+            </a:r>
+            <a:r>
+              <a:rPr lang="es-AR" dirty="0">
+                <a:hlinkClick r:id="rId3"/>
+              </a:rPr>
+              <a:t>https://</a:t>
+            </a:r>
+            <a:r>
+              <a:rPr lang="es-AR" dirty="0" smtClean="0">
+                <a:hlinkClick r:id="rId3"/>
+              </a:rPr>
+              <a:t>goo.gl/7ARiqj</a:t>
+            </a:r>
+            <a:r>
+              <a:rPr lang="es-AR" dirty="0" smtClean="0"/>
+              <a:t> </a:t>
+            </a:r>
+          </a:p>
+          <a:p>
+            <a:r>
+              <a:rPr lang="es-AR" dirty="0"/>
+              <a:t>ORM </a:t>
+            </a:r>
+            <a:r>
+              <a:rPr lang="es-AR" dirty="0">
+                <a:hlinkClick r:id="rId2"/>
+              </a:rPr>
+              <a:t>https://</a:t>
+            </a:r>
+            <a:r>
+              <a:rPr lang="es-AR" dirty="0" smtClean="0">
+                <a:hlinkClick r:id="rId2"/>
+              </a:rPr>
+              <a:t>goo.gl/IWvH61</a:t>
+            </a:r>
+            <a:r>
+              <a:rPr lang="es-AR" dirty="0" smtClean="0"/>
+              <a:t> </a:t>
+            </a:r>
+          </a:p>
+          <a:p>
+            <a:r>
+              <a:rPr lang="es-AR" dirty="0" smtClean="0"/>
+              <a:t>DB </a:t>
+            </a:r>
+            <a:r>
+              <a:rPr lang="es-AR" dirty="0"/>
+              <a:t>en </a:t>
+            </a:r>
+            <a:r>
+              <a:rPr lang="es-AR" dirty="0" smtClean="0"/>
+              <a:t>memoria</a:t>
+            </a:r>
+          </a:p>
+          <a:p>
+            <a:r>
+              <a:rPr lang="es-AR" dirty="0" err="1" smtClean="0"/>
+              <a:t>NodeJS</a:t>
+            </a:r>
+            <a:endParaRPr lang="es-AR" dirty="0" smtClean="0"/>
+          </a:p>
+          <a:p>
+            <a:r>
+              <a:rPr lang="es-AR" dirty="0" err="1" smtClean="0"/>
+              <a:t>Npm</a:t>
+            </a:r>
+            <a:endParaRPr lang="es-AR" dirty="0" smtClean="0"/>
+          </a:p>
+          <a:p>
+            <a:r>
+              <a:rPr lang="es-AR" dirty="0" err="1" smtClean="0"/>
+              <a:t>Postman</a:t>
+            </a:r>
+            <a:endParaRPr lang="es-AR" dirty="0" smtClean="0"/>
+          </a:p>
+          <a:p>
+            <a:r>
+              <a:rPr lang="es-AR" dirty="0" smtClean="0"/>
+              <a:t>Patrones </a:t>
+            </a:r>
+            <a:r>
+              <a:rPr lang="es-AR" dirty="0"/>
+              <a:t>de diseño, </a:t>
+            </a:r>
+            <a:r>
+              <a:rPr lang="es-AR" dirty="0" smtClean="0"/>
+              <a:t>MVC</a:t>
+            </a:r>
+          </a:p>
+          <a:p>
+            <a:r>
+              <a:rPr lang="es-AR" dirty="0" err="1" smtClean="0"/>
+              <a:t>Logging</a:t>
+            </a:r>
+            <a:endParaRPr lang="es-AR" dirty="0"/>
           </a:p>
         </p:txBody>
       </p:sp>
@@ -12991,7 +13108,6 @@
               <a:rPr lang="es-AR" dirty="0"/>
               <a:t>Tecnologías</a:t>
             </a:r>
-            <a:endParaRPr lang="es-AR" dirty="0"/>
           </a:p>
         </p:txBody>
       </p:sp>
@@ -13140,9 +13256,182 @@
               <a:t>Archivo </a:t>
             </a:r>
             <a:r>
+              <a:rPr lang="es-AR" dirty="0" err="1" smtClean="0">
+                <a:latin typeface="Consolas" panose="020B0609020204030204" pitchFamily="49" charset="0"/>
+              </a:rPr>
+              <a:t>Program.cs</a:t>
+            </a:r>
+            <a:r>
+              <a:rPr lang="es-AR" dirty="0" smtClean="0"/>
+              <a:t>: Inicio del programa. Configuración inicial de la aplicación</a:t>
+            </a:r>
+          </a:p>
+          <a:p>
+            <a:r>
+              <a:rPr lang="es-AR" dirty="0"/>
+              <a:t>Archivo </a:t>
+            </a:r>
+            <a:r>
+              <a:rPr lang="es-AR" dirty="0" err="1" smtClean="0">
+                <a:latin typeface="Consolas" panose="020B0609020204030204" pitchFamily="49" charset="0"/>
+              </a:rPr>
+              <a:t>Startup.cs</a:t>
+            </a:r>
+            <a:r>
+              <a:rPr lang="es-AR" dirty="0" smtClean="0"/>
+              <a:t>: Configuración de ASP.NET Core</a:t>
+            </a:r>
+          </a:p>
+          <a:p>
+            <a:r>
+              <a:rPr lang="es-AR" dirty="0" smtClean="0"/>
+              <a:t>Carpeta </a:t>
+            </a:r>
+            <a:r>
+              <a:rPr lang="es-AR" dirty="0" err="1" smtClean="0">
+                <a:latin typeface="Consolas" panose="020B0609020204030204" pitchFamily="49" charset="0"/>
+              </a:rPr>
+              <a:t>Controllers</a:t>
+            </a:r>
+            <a:r>
+              <a:rPr lang="es-AR" dirty="0" smtClean="0"/>
+              <a:t> y </a:t>
+            </a:r>
+            <a:r>
+              <a:rPr lang="es-AR" dirty="0"/>
+              <a:t>archivos </a:t>
+            </a:r>
+            <a:r>
+              <a:rPr lang="es-AR" dirty="0">
+                <a:latin typeface="Consolas" panose="020B0609020204030204" pitchFamily="49" charset="0"/>
+              </a:rPr>
+              <a:t>[</a:t>
+            </a:r>
+            <a:r>
+              <a:rPr lang="es-AR" dirty="0" err="1" smtClean="0">
+                <a:latin typeface="Consolas" panose="020B0609020204030204" pitchFamily="49" charset="0"/>
+              </a:rPr>
+              <a:t>Name</a:t>
+            </a:r>
+            <a:r>
+              <a:rPr lang="es-AR" dirty="0" smtClean="0">
+                <a:latin typeface="Consolas" panose="020B0609020204030204" pitchFamily="49" charset="0"/>
+              </a:rPr>
+              <a:t>]</a:t>
+            </a:r>
+            <a:r>
+              <a:rPr lang="es-AR" dirty="0" err="1" smtClean="0">
+                <a:latin typeface="Consolas" panose="020B0609020204030204" pitchFamily="49" charset="0"/>
+              </a:rPr>
+              <a:t>Controller.cs</a:t>
+            </a:r>
+            <a:r>
+              <a:rPr lang="es-AR" dirty="0" smtClean="0"/>
+              <a:t>: Contiene los controladores que son los puntos de entrada de nuestros </a:t>
+            </a:r>
+            <a:r>
               <a:rPr lang="es-AR" dirty="0" err="1" smtClean="0"/>
-              <a:t>Program</a:t>
-            </a:r>
+              <a:t>endpoints</a:t>
+            </a:r>
+            <a:endParaRPr lang="es-AR" dirty="0" smtClean="0"/>
+          </a:p>
+          <a:p>
+            <a:r>
+              <a:rPr lang="es-AR" dirty="0"/>
+              <a:t>Carpeta </a:t>
+            </a:r>
+            <a:r>
+              <a:rPr lang="es-AR" dirty="0" err="1">
+                <a:latin typeface="Consolas" panose="020B0609020204030204" pitchFamily="49" charset="0"/>
+              </a:rPr>
+              <a:t>Service</a:t>
+            </a:r>
+            <a:r>
+              <a:rPr lang="es-AR" dirty="0" smtClean="0"/>
+              <a:t>: Servicios de nuestra para nuestra aplicación. Se encuentran los contratos (interfaces) y la implementación de los mismos (clases). Estos están registrados por medio de DI</a:t>
+            </a:r>
+          </a:p>
+          <a:p>
+            <a:r>
+              <a:rPr lang="es-AR" dirty="0"/>
+              <a:t>Carpeta </a:t>
+            </a:r>
+            <a:r>
+              <a:rPr lang="es-AR" dirty="0" smtClean="0">
+                <a:latin typeface="Consolas" panose="020B0609020204030204" pitchFamily="49" charset="0"/>
+              </a:rPr>
+              <a:t>Data</a:t>
+            </a:r>
+            <a:r>
+              <a:rPr lang="es-AR" dirty="0" smtClean="0"/>
+              <a:t>: Contiene el archivo de configuración de EF Core (</a:t>
+            </a:r>
+            <a:r>
+              <a:rPr lang="es-AR" dirty="0" err="1" smtClean="0"/>
+              <a:t>dbcontext</a:t>
+            </a:r>
+            <a:r>
+              <a:rPr lang="es-AR" dirty="0" smtClean="0"/>
+              <a:t>) y el archivo de inicialización de los datos</a:t>
+            </a:r>
+          </a:p>
+          <a:p>
+            <a:r>
+              <a:rPr lang="es-AR" dirty="0"/>
+              <a:t>Carpeta </a:t>
+            </a:r>
+            <a:r>
+              <a:rPr lang="es-AR" dirty="0" smtClean="0">
+                <a:latin typeface="Consolas" panose="020B0609020204030204" pitchFamily="49" charset="0"/>
+              </a:rPr>
+              <a:t>Data/</a:t>
+            </a:r>
+            <a:r>
+              <a:rPr lang="es-AR" dirty="0" err="1" smtClean="0">
+                <a:latin typeface="Consolas" panose="020B0609020204030204" pitchFamily="49" charset="0"/>
+              </a:rPr>
+              <a:t>Entities</a:t>
+            </a:r>
+            <a:r>
+              <a:rPr lang="es-AR" dirty="0" smtClean="0"/>
+              <a:t>: Contiene la(s) entidad(es) de nuestro proyecto.</a:t>
+            </a:r>
+          </a:p>
+          <a:p>
+            <a:r>
+              <a:rPr lang="es-AR" dirty="0"/>
+              <a:t>Carpeta </a:t>
+            </a:r>
+            <a:r>
+              <a:rPr lang="es-AR" dirty="0" smtClean="0">
+                <a:latin typeface="Consolas" panose="020B0609020204030204" pitchFamily="49" charset="0"/>
+              </a:rPr>
+              <a:t>Data/</a:t>
+            </a:r>
+            <a:r>
+              <a:rPr lang="es-AR" dirty="0" err="1" smtClean="0">
+                <a:latin typeface="Consolas" panose="020B0609020204030204" pitchFamily="49" charset="0"/>
+              </a:rPr>
+              <a:t>Models</a:t>
+            </a:r>
+            <a:r>
+              <a:rPr lang="es-AR" dirty="0" smtClean="0"/>
+              <a:t>: </a:t>
+            </a:r>
+            <a:r>
+              <a:rPr lang="es-AR" dirty="0"/>
+              <a:t>Contiene </a:t>
+            </a:r>
+            <a:r>
+              <a:rPr lang="es-AR" dirty="0" smtClean="0"/>
+              <a:t>el/los modelo(s</a:t>
+            </a:r>
+            <a:r>
+              <a:rPr lang="es-AR" dirty="0"/>
+              <a:t>) de nuestro proyecto.</a:t>
+            </a:r>
+          </a:p>
+          <a:p>
             <a:endParaRPr lang="es-AR" dirty="0"/>
           </a:p>
         </p:txBody>

</xml_diff>